<commit_message>
Update sequence diagram to replace references to "AddressBook" with "HealthBase"
</commit_message>
<xml_diff>
--- a/docs/diagrams/AddmedsSequenceDiagram.pptx
+++ b/docs/diagrams/AddmedsSequenceDiagram.pptx
@@ -3850,18 +3850,15 @@
                   <a:schemeClr val="bg1"/>
                 </a:solidFill>
               </a:rPr>
-              <a:t>:Address</a:t>
-            </a:r>
-          </a:p>
-          <a:p>
-            <a:pPr algn="ctr"/>
+              <a:t>:</a:t>
+            </a:r>
             <a:r>
               <a:rPr lang="en-US" sz="1600" dirty="0" err="1">
                 <a:solidFill>
                   <a:schemeClr val="bg1"/>
                 </a:solidFill>
               </a:rPr>
-              <a:t>BookParser</a:t>
+              <a:t>HealthBaseParser</a:t>
             </a:r>
             <a:endParaRPr lang="en-SG" sz="1600" dirty="0">
               <a:solidFill>
@@ -4565,7 +4562,7 @@
                   <a:schemeClr val="bg1"/>
                 </a:solidFill>
               </a:rPr>
-              <a:t>AddressBook</a:t>
+              <a:t>HealthBase</a:t>
             </a:r>
             <a:endParaRPr lang="en-SG" sz="1600" dirty="0">
               <a:solidFill>

</xml_diff>